<commit_message>
Modify some files by Holley.
</commit_message>
<xml_diff>
--- a/cross_platform/doc/09_algorithm_math.pptx
+++ b/cross_platform/doc/09_algorithm_math.pptx
@@ -261,7 +261,7 @@
             <a:fld id="{23FD1BB4-CFA6-485E-A17F-D6497C6DC719}" type="datetime1">
               <a:rPr lang="en-US" smtClean="0"/>
               <a:pPr/>
-              <a:t>5/6/2014</a:t>
+              <a:t>5/7/2014</a:t>
             </a:fld>
             <a:endParaRPr lang="en-US"/>
           </a:p>
@@ -484,7 +484,7 @@
             <a:fld id="{B8FD772F-022A-43FB-ADB5-FCDE7C9E482C}" type="datetime1">
               <a:rPr lang="en-US" smtClean="0"/>
               <a:pPr/>
-              <a:t>5/6/2014</a:t>
+              <a:t>5/7/2014</a:t>
             </a:fld>
             <a:endParaRPr lang="en-US"/>
           </a:p>
@@ -935,7 +935,7 @@
             <a:fld id="{A660DE63-EAE8-47C8-B220-6813AA5D1216}" type="datetime1">
               <a:rPr lang="en-US" smtClean="0"/>
               <a:pPr/>
-              <a:t>5/6/2014</a:t>
+              <a:t>5/7/2014</a:t>
             </a:fld>
             <a:endParaRPr lang="en-US"/>
           </a:p>
@@ -1071,7 +1071,7 @@
             <a:fld id="{B43692A6-C5EE-4971-B280-F89F2F240D34}" type="datetime1">
               <a:rPr lang="en-US" smtClean="0"/>
               <a:pPr/>
-              <a:t>5/6/2014</a:t>
+              <a:t>5/7/2014</a:t>
             </a:fld>
             <a:endParaRPr lang="en-US"/>
           </a:p>
@@ -1235,7 +1235,7 @@
           <a:p>
             <a:fld id="{E264306B-523A-F745-9C45-C455E08223C8}" type="datetime1">
               <a:rPr lang="zh-CN" altLang="en-US" smtClean="0"/>
-              <a:t>2014/5/6</a:t>
+              <a:t>2014/5/7</a:t>
             </a:fld>
             <a:endParaRPr lang="en-US" dirty="0"/>
           </a:p>
@@ -1429,7 +1429,7 @@
           <a:p>
             <a:fld id="{B7A4FF15-4781-9E4D-871D-31952D42A0D3}" type="datetime1">
               <a:rPr lang="zh-CN" altLang="en-US" smtClean="0"/>
-              <a:t>2014/5/6</a:t>
+              <a:t>2014/5/7</a:t>
             </a:fld>
             <a:endParaRPr lang="en-US" dirty="0"/>
           </a:p>
@@ -1680,7 +1680,7 @@
           <a:p>
             <a:fld id="{D9F73309-2F8E-1042-BAE1-9C4A16973CEF}" type="datetime1">
               <a:rPr lang="zh-CN" altLang="en-US" smtClean="0"/>
-              <a:t>2014/5/6</a:t>
+              <a:t>2014/5/7</a:t>
             </a:fld>
             <a:endParaRPr lang="en-US" dirty="0"/>
           </a:p>
@@ -1938,7 +1938,7 @@
           <a:p>
             <a:fld id="{B1526EC2-5697-524A-8330-A6FAC91C8AD2}" type="datetime1">
               <a:rPr lang="zh-CN" altLang="en-US" smtClean="0"/>
-              <a:t>2014/5/6</a:t>
+              <a:t>2014/5/7</a:t>
             </a:fld>
             <a:endParaRPr lang="en-US" dirty="0"/>
           </a:p>
@@ -2285,7 +2285,7 @@
           <a:p>
             <a:fld id="{0A39E2DC-0BCE-1D4E-B1DD-98B60F29020F}" type="datetime1">
               <a:rPr lang="zh-CN" altLang="en-US" smtClean="0"/>
-              <a:t>2014/5/6</a:t>
+              <a:t>2014/5/7</a:t>
             </a:fld>
             <a:endParaRPr lang="en-US" dirty="0"/>
           </a:p>
@@ -2535,7 +2535,7 @@
           <a:p>
             <a:fld id="{7EE0CCF7-FEF8-F846-A8E9-9E240DB036DA}" type="datetime1">
               <a:rPr lang="zh-CN" altLang="en-US" smtClean="0"/>
-              <a:t>2014/5/6</a:t>
+              <a:t>2014/5/7</a:t>
             </a:fld>
             <a:endParaRPr lang="en-US" dirty="0"/>
           </a:p>
@@ -2887,7 +2887,7 @@
           <a:p>
             <a:fld id="{8CF85ACE-72B6-D642-ADC8-79393EF6AB6B}" type="datetime1">
               <a:rPr lang="zh-CN" altLang="en-US" smtClean="0"/>
-              <a:t>2014/5/6</a:t>
+              <a:t>2014/5/7</a:t>
             </a:fld>
             <a:endParaRPr lang="en-US" dirty="0"/>
           </a:p>
@@ -3062,7 +3062,7 @@
           <a:p>
             <a:fld id="{E9C95C45-B8C6-3D46-8B54-EB71BB2DBE9C}" type="datetime1">
               <a:rPr lang="zh-CN" altLang="en-US" smtClean="0"/>
-              <a:t>2014/5/6</a:t>
+              <a:t>2014/5/7</a:t>
             </a:fld>
             <a:endParaRPr lang="en-US" dirty="0"/>
           </a:p>
@@ -3214,7 +3214,7 @@
           <a:p>
             <a:fld id="{897AA826-FEAF-7A46-A3D9-C347FDEC4142}" type="datetime1">
               <a:rPr lang="zh-CN" altLang="en-US" smtClean="0"/>
-              <a:t>2014/5/6</a:t>
+              <a:t>2014/5/7</a:t>
             </a:fld>
             <a:endParaRPr lang="en-US" dirty="0"/>
           </a:p>
@@ -4051,15 +4051,7 @@
                   <a:srgbClr val="800000"/>
                 </a:solidFill>
               </a:rPr>
-              <a:t>05</a:t>
-            </a:r>
-            <a:r>
-              <a:rPr lang="en-US" dirty="0" smtClean="0">
-                <a:solidFill>
-                  <a:srgbClr val="800000"/>
-                </a:solidFill>
-              </a:rPr>
-              <a:t>/02/2014</a:t>
+              <a:t>05/02/2014</a:t>
             </a:r>
             <a:endParaRPr lang="en-US" dirty="0">
               <a:solidFill>
@@ -4152,7 +4144,7 @@
           <a:p>
             <a:fld id="{D5292C65-34C7-D54B-8DCF-FB5368A2A8E7}" type="datetime1">
               <a:rPr lang="zh-CN" altLang="en-US" smtClean="0"/>
-              <a:t>2014/5/6</a:t>
+              <a:t>2014/5/7</a:t>
             </a:fld>
             <a:endParaRPr lang="en-US" dirty="0"/>
           </a:p>
@@ -4323,7 +4315,7 @@
           <a:p>
             <a:fld id="{AF70D050-E4CB-EE4A-A154-C1F3CA566703}" type="datetime1">
               <a:rPr lang="zh-CN" altLang="en-US" smtClean="0"/>
-              <a:t>2014/5/6</a:t>
+              <a:t>2014/5/7</a:t>
             </a:fld>
             <a:endParaRPr lang="en-US" dirty="0"/>
           </a:p>
@@ -4484,11 +4476,7 @@
             </a:pPr>
             <a:r>
               <a:rPr lang="en-US" sz="2000" dirty="0" smtClean="0"/>
-              <a:t>Function</a:t>
-            </a:r>
-            <a:r>
-              <a:rPr lang="en-US" sz="2000" dirty="0" smtClean="0"/>
-              <a:t> </a:t>
+              <a:t>Function </a:t>
             </a:r>
           </a:p>
           <a:p>
@@ -4645,7 +4633,7 @@
           <a:p>
             <a:fld id="{C498A5F6-731E-EE4F-A9AE-19A6E243FE21}" type="datetime1">
               <a:rPr lang="zh-CN" altLang="en-US" smtClean="0"/>
-              <a:t>2014/5/6</a:t>
+              <a:t>2014/5/7</a:t>
             </a:fld>
             <a:endParaRPr lang="en-US" dirty="0"/>
           </a:p>
@@ -4912,7 +4900,7 @@
           <a:p>
             <a:fld id="{C498A5F6-731E-EE4F-A9AE-19A6E243FE21}" type="datetime1">
               <a:rPr lang="zh-CN" altLang="en-US" smtClean="0"/>
-              <a:t>2014/5/6</a:t>
+              <a:t>2014/5/7</a:t>
             </a:fld>
             <a:endParaRPr lang="en-US" dirty="0"/>
           </a:p>
@@ -5063,7 +5051,7 @@
           <a:p>
             <a:fld id="{C498A5F6-731E-EE4F-A9AE-19A6E243FE21}" type="datetime1">
               <a:rPr lang="zh-CN" altLang="en-US" smtClean="0"/>
-              <a:t>2014/5/6</a:t>
+              <a:t>2014/5/7</a:t>
             </a:fld>
             <a:endParaRPr lang="en-US" dirty="0"/>
           </a:p>
@@ -5381,7 +5369,7 @@
           <a:p>
             <a:fld id="{C498A5F6-731E-EE4F-A9AE-19A6E243FE21}" type="datetime1">
               <a:rPr lang="zh-CN" altLang="en-US" smtClean="0"/>
-              <a:t>2014/5/6</a:t>
+              <a:t>2014/5/7</a:t>
             </a:fld>
             <a:endParaRPr lang="en-US" dirty="0"/>
           </a:p>
@@ -5756,7 +5744,72 @@
           <a:bodyPr/>
           <a:lstStyle/>
           <a:p>
-            <a:endParaRPr lang="it-IT" dirty="0"/>
+            <a:r>
+              <a:rPr lang="it-IT" sz="2000" dirty="0" smtClean="0"/>
+              <a:t>Usage</a:t>
+            </a:r>
+          </a:p>
+          <a:p>
+            <a:pPr lvl="1"/>
+            <a:r>
+              <a:rPr lang="it-IT" sz="1600" dirty="0" smtClean="0"/>
+              <a:t>&lt;boost/crc.hpp&gt;</a:t>
+            </a:r>
+          </a:p>
+          <a:p>
+            <a:r>
+              <a:rPr lang="it-IT" sz="2000" dirty="0" smtClean="0"/>
+              <a:t>c</a:t>
+            </a:r>
+            <a:r>
+              <a:rPr lang="it-IT" sz="2000" dirty="0" smtClean="0"/>
+              <a:t>rc_32_type</a:t>
+            </a:r>
+          </a:p>
+          <a:p>
+            <a:pPr lvl="1"/>
+            <a:r>
+              <a:rPr lang="it-IT" sz="1600" dirty="0" smtClean="0"/>
+              <a:t>process_byte</a:t>
+            </a:r>
+          </a:p>
+          <a:p>
+            <a:pPr lvl="1"/>
+            <a:r>
+              <a:rPr lang="it-IT" sz="1600" dirty="0" smtClean="0"/>
+              <a:t>Process_bytes</a:t>
+            </a:r>
+          </a:p>
+          <a:p>
+            <a:pPr lvl="1"/>
+            <a:r>
+              <a:rPr lang="it-IT" sz="1600" dirty="0" smtClean="0"/>
+              <a:t>process_block</a:t>
+            </a:r>
+          </a:p>
+          <a:p>
+            <a:pPr lvl="1"/>
+            <a:r>
+              <a:rPr lang="en-US" altLang="zh-CN" sz="1600" dirty="0" smtClean="0"/>
+              <a:t>checksum</a:t>
+            </a:r>
+            <a:r>
+              <a:rPr lang="en-US" altLang="zh-CN" sz="1600" dirty="0"/>
+              <a:t>()</a:t>
+            </a:r>
+            <a:endParaRPr lang="it-IT" sz="1600" dirty="0" smtClean="0"/>
+          </a:p>
+          <a:p>
+            <a:pPr lvl="1"/>
+            <a:r>
+              <a:rPr lang="it-IT" sz="1600" dirty="0" smtClean="0"/>
+              <a:t>o</a:t>
+            </a:r>
+            <a:r>
+              <a:rPr lang="it-IT" sz="1600" dirty="0" smtClean="0"/>
+              <a:t>verload () --- crc()     </a:t>
+            </a:r>
+            <a:endParaRPr lang="it-IT" sz="1600" dirty="0"/>
           </a:p>
         </p:txBody>
       </p:sp>
@@ -5777,7 +5830,7 @@
           <a:p>
             <a:fld id="{C498A5F6-731E-EE4F-A9AE-19A6E243FE21}" type="datetime1">
               <a:rPr lang="zh-CN" altLang="en-US" smtClean="0"/>
-              <a:t>2014/5/6</a:t>
+              <a:t>2014/5/7</a:t>
             </a:fld>
             <a:endParaRPr lang="en-US" dirty="0"/>
           </a:p>
@@ -5899,15 +5952,6 @@
               </a:rPr>
               <a:t>Random</a:t>
             </a:r>
-            <a:endParaRPr lang="en-US" b="1" i="1" u="sng" dirty="0" smtClean="0">
-              <a:effectLst>
-                <a:outerShdw blurRad="38100" dist="38100" dir="2700000" algn="tl">
-                  <a:srgbClr val="000000">
-                    <a:alpha val="43137"/>
-                  </a:srgbClr>
-                </a:outerShdw>
-              </a:effectLst>
-            </a:endParaRPr>
           </a:p>
         </p:txBody>
       </p:sp>
@@ -5931,7 +5975,86 @@
           <a:bodyPr/>
           <a:lstStyle/>
           <a:p>
+            <a:r>
+              <a:rPr lang="it-IT" sz="2000" dirty="0" smtClean="0"/>
+              <a:t>Usage</a:t>
+            </a:r>
+          </a:p>
+          <a:p>
+            <a:pPr lvl="1"/>
+            <a:r>
+              <a:rPr lang="it-IT" sz="1600" dirty="0" smtClean="0"/>
+              <a:t>&lt;boost/random.hpp&gt;</a:t>
+            </a:r>
             <a:endParaRPr lang="it-IT" dirty="0"/>
+          </a:p>
+          <a:p>
+            <a:r>
+              <a:rPr lang="it-IT" sz="2000" dirty="0" smtClean="0"/>
+              <a:t>Random generator</a:t>
+            </a:r>
+          </a:p>
+          <a:p>
+            <a:pPr lvl="1"/>
+            <a:r>
+              <a:rPr lang="it-IT" sz="1600" dirty="0"/>
+              <a:t>r</a:t>
+            </a:r>
+            <a:r>
+              <a:rPr lang="it-IT" sz="1600" dirty="0" smtClean="0"/>
+              <a:t>and48</a:t>
+            </a:r>
+          </a:p>
+          <a:p>
+            <a:pPr lvl="1"/>
+            <a:r>
+              <a:rPr lang="it-IT" sz="1600" dirty="0"/>
+              <a:t>m</a:t>
+            </a:r>
+            <a:r>
+              <a:rPr lang="it-IT" sz="1600" dirty="0" smtClean="0"/>
+              <a:t>t19937</a:t>
+            </a:r>
+          </a:p>
+          <a:p>
+            <a:pPr lvl="1"/>
+            <a:r>
+              <a:rPr lang="it-IT" sz="1600" dirty="0" smtClean="0"/>
+              <a:t>lagged_fibonacci19937</a:t>
+            </a:r>
+          </a:p>
+          <a:p>
+            <a:r>
+              <a:rPr lang="it-IT" sz="2000" dirty="0" smtClean="0"/>
+              <a:t>Random distribution</a:t>
+            </a:r>
+          </a:p>
+          <a:p>
+            <a:pPr lvl="1"/>
+            <a:r>
+              <a:rPr lang="en-US" altLang="zh-CN" sz="1600" dirty="0" err="1" smtClean="0"/>
+              <a:t>uniform_int</a:t>
+            </a:r>
+            <a:endParaRPr lang="en-US" altLang="zh-CN" sz="1600" dirty="0" smtClean="0"/>
+          </a:p>
+          <a:p>
+            <a:pPr lvl="1"/>
+            <a:r>
+              <a:rPr lang="en-US" altLang="zh-CN" sz="1600" dirty="0" smtClean="0"/>
+              <a:t>uniform_01</a:t>
+            </a:r>
+          </a:p>
+          <a:p>
+            <a:pPr lvl="1"/>
+            <a:r>
+              <a:rPr lang="en-US" sz="1600" dirty="0" err="1"/>
+              <a:t>n</a:t>
+            </a:r>
+            <a:r>
+              <a:rPr lang="en-US" sz="1600" dirty="0" err="1" smtClean="0"/>
+              <a:t>ormal_distribution</a:t>
+            </a:r>
+            <a:endParaRPr lang="it-IT" sz="1600" dirty="0" smtClean="0"/>
           </a:p>
         </p:txBody>
       </p:sp>
@@ -5952,7 +6075,7 @@
           <a:p>
             <a:fld id="{C498A5F6-731E-EE4F-A9AE-19A6E243FE21}" type="datetime1">
               <a:rPr lang="zh-CN" altLang="en-US" smtClean="0"/>
-              <a:t>2014/5/6</a:t>
+              <a:t>2014/5/7</a:t>
             </a:fld>
             <a:endParaRPr lang="en-US" dirty="0"/>
           </a:p>
@@ -6110,7 +6233,7 @@
           <a:p>
             <a:fld id="{955F47AC-54AF-4F48-8E56-84412C8607DC}" type="datetime1">
               <a:rPr lang="zh-CN" altLang="en-US" smtClean="0"/>
-              <a:t>2014/5/6</a:t>
+              <a:t>2014/5/7</a:t>
             </a:fld>
             <a:endParaRPr lang="en-US" dirty="0"/>
           </a:p>
@@ -7147,6 +7270,27 @@
 </file>
 
 <file path=customXml/item1.xml><?xml version="1.0" encoding="utf-8"?>
+<?mso-contentType ?>
+<FormTemplates xmlns="http://schemas.microsoft.com/sharepoint/v3/contenttype/forms">
+  <Display>DocumentLibraryForm</Display>
+  <Edit>DocumentLibraryForm</Edit>
+  <New>DocumentLibraryForm</New>
+</FormTemplates>
+</file>
+
+<file path=customXml/item2.xml><?xml version="1.0" encoding="utf-8"?>
+<p:properties xmlns:p="http://schemas.microsoft.com/office/2006/metadata/properties" xmlns:xsi="http://www.w3.org/2001/XMLSchema-instance" xmlns:pc="http://schemas.microsoft.com/office/infopath/2007/PartnerControls">
+  <documentManagement>
+    <_dlc_DocId xmlns="0fb17d87-4c73-4408-bf5c-e954fa7f562e">AQ7EPMACNK3R-116-90</_dlc_DocId>
+    <_dlc_DocIdUrl xmlns="0fb17d87-4c73-4408-bf5c-e954fa7f562e">
+      <Url>http://tw.ishare2.trendmicro.com/sites/coretecheng/Frontend/ThreatSolution/CDC/_layouts/DocIdRedir.aspx?ID=AQ7EPMACNK3R-116-90</Url>
+      <Description>AQ7EPMACNK3R-116-90</Description>
+    </_dlc_DocIdUrl>
+  </documentManagement>
+</p:properties>
+</file>
+
+<file path=customXml/item3.xml><?xml version="1.0" encoding="utf-8"?>
 <ct:contentTypeSchema xmlns:ct="http://schemas.microsoft.com/office/2006/metadata/contentType" xmlns:ma="http://schemas.microsoft.com/office/2006/metadata/properties/metaAttributes" ct:_="" ma:_="" ma:contentTypeName="Document" ma:contentTypeID="0x010100083A9CADA8FB604BBDE8CAA445B8D68F" ma:contentTypeVersion="0" ma:contentTypeDescription="Create a new document." ma:contentTypeScope="" ma:versionID="3a22a13b632bdae2d797a977fcbec8e4">
   <xsd:schema xmlns:xsd="http://www.w3.org/2001/XMLSchema" xmlns:xs="http://www.w3.org/2001/XMLSchema" xmlns:p="http://schemas.microsoft.com/office/2006/metadata/properties" xmlns:ns2="0fb17d87-4c73-4408-bf5c-e954fa7f562e" targetNamespace="http://schemas.microsoft.com/office/2006/metadata/properties" ma:root="true" ma:fieldsID="7635a5278dc560f10bdf602434a011cf" ns2:_="">
     <xsd:import namespace="0fb17d87-4c73-4408-bf5c-e954fa7f562e"/>
@@ -7291,27 +7435,6 @@
 </ct:contentTypeSchema>
 </file>
 
-<file path=customXml/item2.xml><?xml version="1.0" encoding="utf-8"?>
-<p:properties xmlns:p="http://schemas.microsoft.com/office/2006/metadata/properties" xmlns:xsi="http://www.w3.org/2001/XMLSchema-instance" xmlns:pc="http://schemas.microsoft.com/office/infopath/2007/PartnerControls">
-  <documentManagement>
-    <_dlc_DocId xmlns="0fb17d87-4c73-4408-bf5c-e954fa7f562e">AQ7EPMACNK3R-116-90</_dlc_DocId>
-    <_dlc_DocIdUrl xmlns="0fb17d87-4c73-4408-bf5c-e954fa7f562e">
-      <Url>http://tw.ishare2.trendmicro.com/sites/coretecheng/Frontend/ThreatSolution/CDC/_layouts/DocIdRedir.aspx?ID=AQ7EPMACNK3R-116-90</Url>
-      <Description>AQ7EPMACNK3R-116-90</Description>
-    </_dlc_DocIdUrl>
-  </documentManagement>
-</p:properties>
-</file>
-
-<file path=customXml/item3.xml><?xml version="1.0" encoding="utf-8"?>
-<?mso-contentType ?>
-<FormTemplates xmlns="http://schemas.microsoft.com/sharepoint/v3/contenttype/forms">
-  <Display>DocumentLibraryForm</Display>
-  <Edit>DocumentLibraryForm</Edit>
-  <New>DocumentLibraryForm</New>
-</FormTemplates>
-</file>
-
 <file path=customXml/item4.xml><?xml version="1.0" encoding="utf-8"?>
 <?mso-contentType ?>
 <spe:Receivers xmlns:spe="http://schemas.microsoft.com/sharepoint/events">
@@ -7359,6 +7482,24 @@
 </file>
 
 <file path=customXml/itemProps1.xml><?xml version="1.0" encoding="utf-8"?>
+<ds:datastoreItem xmlns:ds="http://schemas.openxmlformats.org/officeDocument/2006/customXml" ds:itemID="{68191639-3057-4178-A6E9-9D5105949EE9}">
+  <ds:schemaRefs>
+    <ds:schemaRef ds:uri="http://schemas.microsoft.com/sharepoint/v3/contenttype/forms"/>
+  </ds:schemaRefs>
+</ds:datastoreItem>
+</file>
+
+<file path=customXml/itemProps2.xml><?xml version="1.0" encoding="utf-8"?>
+<ds:datastoreItem xmlns:ds="http://schemas.openxmlformats.org/officeDocument/2006/customXml" ds:itemID="{1CBAA93B-99F0-4824-A8C6-FEF886C71949}">
+  <ds:schemaRefs>
+    <ds:schemaRef ds:uri="http://schemas.microsoft.com/office/2006/metadata/properties"/>
+    <ds:schemaRef ds:uri="http://schemas.microsoft.com/office/infopath/2007/PartnerControls"/>
+    <ds:schemaRef ds:uri="0fb17d87-4c73-4408-bf5c-e954fa7f562e"/>
+  </ds:schemaRefs>
+</ds:datastoreItem>
+</file>
+
+<file path=customXml/itemProps3.xml><?xml version="1.0" encoding="utf-8"?>
 <ds:datastoreItem xmlns:ds="http://schemas.openxmlformats.org/officeDocument/2006/customXml" ds:itemID="{413719CF-E1AD-4AAC-A60E-4F569E379D79}">
   <ds:schemaRefs>
     <ds:schemaRef ds:uri="http://schemas.microsoft.com/office/2006/metadata/contentType"/>
@@ -7376,24 +7517,6 @@
 </ds:datastoreItem>
 </file>
 
-<file path=customXml/itemProps2.xml><?xml version="1.0" encoding="utf-8"?>
-<ds:datastoreItem xmlns:ds="http://schemas.openxmlformats.org/officeDocument/2006/customXml" ds:itemID="{1CBAA93B-99F0-4824-A8C6-FEF886C71949}">
-  <ds:schemaRefs>
-    <ds:schemaRef ds:uri="http://schemas.microsoft.com/office/2006/metadata/properties"/>
-    <ds:schemaRef ds:uri="http://schemas.microsoft.com/office/infopath/2007/PartnerControls"/>
-    <ds:schemaRef ds:uri="0fb17d87-4c73-4408-bf5c-e954fa7f562e"/>
-  </ds:schemaRefs>
-</ds:datastoreItem>
-</file>
-
-<file path=customXml/itemProps3.xml><?xml version="1.0" encoding="utf-8"?>
-<ds:datastoreItem xmlns:ds="http://schemas.openxmlformats.org/officeDocument/2006/customXml" ds:itemID="{68191639-3057-4178-A6E9-9D5105949EE9}">
-  <ds:schemaRefs>
-    <ds:schemaRef ds:uri="http://schemas.microsoft.com/sharepoint/v3/contenttype/forms"/>
-  </ds:schemaRefs>
-</ds:datastoreItem>
-</file>
-
 <file path=customXml/itemProps4.xml><?xml version="1.0" encoding="utf-8"?>
 <ds:datastoreItem xmlns:ds="http://schemas.openxmlformats.org/officeDocument/2006/customXml" ds:itemID="{45546556-DB68-4CAB-BF9F-8C795337FA58}">
   <ds:schemaRefs>

</xml_diff>